<commit_message>
kodu modify l4 screen proofs
kodu modify l4 screen proofs
</commit_message>
<xml_diff>
--- a/04kodu/lesson_final.pptx
+++ b/04kodu/lesson_final.pptx
@@ -5,23 +5,19 @@
     <p:sldMasterId id="2147483648" r:id="rId1"/>
   </p:sldMasterIdLst>
   <p:handoutMasterIdLst>
-    <p:handoutMasterId r:id="rId16"/>
+    <p:handoutMasterId r:id="rId12"/>
   </p:handoutMasterIdLst>
   <p:sldIdLst>
     <p:sldId id="256" r:id="rId2"/>
-    <p:sldId id="266" r:id="rId3"/>
-    <p:sldId id="269" r:id="rId4"/>
-    <p:sldId id="267" r:id="rId5"/>
-    <p:sldId id="268" r:id="rId6"/>
-    <p:sldId id="257" r:id="rId7"/>
-    <p:sldId id="265" r:id="rId8"/>
-    <p:sldId id="258" r:id="rId9"/>
-    <p:sldId id="259" r:id="rId10"/>
-    <p:sldId id="260" r:id="rId11"/>
-    <p:sldId id="261" r:id="rId12"/>
-    <p:sldId id="262" r:id="rId13"/>
-    <p:sldId id="263" r:id="rId14"/>
-    <p:sldId id="264" r:id="rId15"/>
+    <p:sldId id="257" r:id="rId3"/>
+    <p:sldId id="265" r:id="rId4"/>
+    <p:sldId id="258" r:id="rId5"/>
+    <p:sldId id="259" r:id="rId6"/>
+    <p:sldId id="260" r:id="rId7"/>
+    <p:sldId id="261" r:id="rId8"/>
+    <p:sldId id="262" r:id="rId9"/>
+    <p:sldId id="263" r:id="rId10"/>
+    <p:sldId id="264" r:id="rId11"/>
   </p:sldIdLst>
   <p:sldSz cx="9144000" cy="6858000" type="screen4x3"/>
   <p:notesSz cx="6797675" cy="9926638"/>
@@ -205,7 +201,8 @@
           <a:p>
             <a:fld id="{5EBAEF01-1625-485B-87E9-F95610F9AED5}" type="datetimeFigureOut">
               <a:rPr lang="en-US" smtClean="0"/>
-              <a:t>2/4/2013</a:t>
+              <a:pPr/>
+              <a:t>6/7/2016</a:t>
             </a:fld>
             <a:endParaRPr lang="en-GB"/>
           </a:p>
@@ -271,6 +268,7 @@
           <a:p>
             <a:fld id="{674A0ACD-C37F-4B4E-BD98-E6CF48681715}" type="slidenum">
               <a:rPr lang="en-GB" smtClean="0"/>
+              <a:pPr/>
               <a:t>‹#›</a:t>
             </a:fld>
             <a:endParaRPr lang="en-GB"/>
@@ -465,7 +463,7 @@
             <a:fld id="{664439BC-D5DA-4702-A251-DDE5BDB443B9}" type="datetimeFigureOut">
               <a:rPr lang="en-GB" smtClean="0"/>
               <a:pPr/>
-              <a:t>04/02/2013</a:t>
+              <a:t>07/06/2016</a:t>
             </a:fld>
             <a:endParaRPr lang="en-GB"/>
           </a:p>
@@ -517,7 +515,7 @@
     </p:spTree>
     <p:extLst>
       <p:ext uri="{BB962C8B-B14F-4D97-AF65-F5344CB8AC3E}">
-        <p14:creationId xmlns:p14="http://schemas.microsoft.com/office/powerpoint/2010/main" xmlns="" val="1708145321"/>
+        <p14:creationId xmlns="" xmlns:p14="http://schemas.microsoft.com/office/powerpoint/2010/main" val="1708145321"/>
       </p:ext>
     </p:extLst>
   </p:cSld>
@@ -637,7 +635,7 @@
             <a:fld id="{664439BC-D5DA-4702-A251-DDE5BDB443B9}" type="datetimeFigureOut">
               <a:rPr lang="en-GB" smtClean="0"/>
               <a:pPr/>
-              <a:t>04/02/2013</a:t>
+              <a:t>07/06/2016</a:t>
             </a:fld>
             <a:endParaRPr lang="en-GB"/>
           </a:p>
@@ -689,7 +687,7 @@
     </p:spTree>
     <p:extLst>
       <p:ext uri="{BB962C8B-B14F-4D97-AF65-F5344CB8AC3E}">
-        <p14:creationId xmlns:p14="http://schemas.microsoft.com/office/powerpoint/2010/main" xmlns="" val="1882581985"/>
+        <p14:creationId xmlns="" xmlns:p14="http://schemas.microsoft.com/office/powerpoint/2010/main" val="1882581985"/>
       </p:ext>
     </p:extLst>
   </p:cSld>
@@ -819,7 +817,7 @@
             <a:fld id="{664439BC-D5DA-4702-A251-DDE5BDB443B9}" type="datetimeFigureOut">
               <a:rPr lang="en-GB" smtClean="0"/>
               <a:pPr/>
-              <a:t>04/02/2013</a:t>
+              <a:t>07/06/2016</a:t>
             </a:fld>
             <a:endParaRPr lang="en-GB"/>
           </a:p>
@@ -871,7 +869,7 @@
     </p:spTree>
     <p:extLst>
       <p:ext uri="{BB962C8B-B14F-4D97-AF65-F5344CB8AC3E}">
-        <p14:creationId xmlns:p14="http://schemas.microsoft.com/office/powerpoint/2010/main" xmlns="" val="2781430390"/>
+        <p14:creationId xmlns="" xmlns:p14="http://schemas.microsoft.com/office/powerpoint/2010/main" val="2781430390"/>
       </p:ext>
     </p:extLst>
   </p:cSld>
@@ -991,7 +989,7 @@
             <a:fld id="{664439BC-D5DA-4702-A251-DDE5BDB443B9}" type="datetimeFigureOut">
               <a:rPr lang="en-GB" smtClean="0"/>
               <a:pPr/>
-              <a:t>04/02/2013</a:t>
+              <a:t>07/06/2016</a:t>
             </a:fld>
             <a:endParaRPr lang="en-GB"/>
           </a:p>
@@ -1043,7 +1041,7 @@
     </p:spTree>
     <p:extLst>
       <p:ext uri="{BB962C8B-B14F-4D97-AF65-F5344CB8AC3E}">
-        <p14:creationId xmlns:p14="http://schemas.microsoft.com/office/powerpoint/2010/main" xmlns="" val="1430879976"/>
+        <p14:creationId xmlns="" xmlns:p14="http://schemas.microsoft.com/office/powerpoint/2010/main" val="1430879976"/>
       </p:ext>
     </p:extLst>
   </p:cSld>
@@ -1239,7 +1237,7 @@
             <a:fld id="{664439BC-D5DA-4702-A251-DDE5BDB443B9}" type="datetimeFigureOut">
               <a:rPr lang="en-GB" smtClean="0"/>
               <a:pPr/>
-              <a:t>04/02/2013</a:t>
+              <a:t>07/06/2016</a:t>
             </a:fld>
             <a:endParaRPr lang="en-GB"/>
           </a:p>
@@ -1291,7 +1289,7 @@
     </p:spTree>
     <p:extLst>
       <p:ext uri="{BB962C8B-B14F-4D97-AF65-F5344CB8AC3E}">
-        <p14:creationId xmlns:p14="http://schemas.microsoft.com/office/powerpoint/2010/main" xmlns="" val="4097045873"/>
+        <p14:creationId xmlns="" xmlns:p14="http://schemas.microsoft.com/office/powerpoint/2010/main" val="4097045873"/>
       </p:ext>
     </p:extLst>
   </p:cSld>
@@ -1529,7 +1527,7 @@
             <a:fld id="{664439BC-D5DA-4702-A251-DDE5BDB443B9}" type="datetimeFigureOut">
               <a:rPr lang="en-GB" smtClean="0"/>
               <a:pPr/>
-              <a:t>04/02/2013</a:t>
+              <a:t>07/06/2016</a:t>
             </a:fld>
             <a:endParaRPr lang="en-GB"/>
           </a:p>
@@ -1581,7 +1579,7 @@
     </p:spTree>
     <p:extLst>
       <p:ext uri="{BB962C8B-B14F-4D97-AF65-F5344CB8AC3E}">
-        <p14:creationId xmlns:p14="http://schemas.microsoft.com/office/powerpoint/2010/main" xmlns="" val="3758040389"/>
+        <p14:creationId xmlns="" xmlns:p14="http://schemas.microsoft.com/office/powerpoint/2010/main" val="3758040389"/>
       </p:ext>
     </p:extLst>
   </p:cSld>
@@ -1953,7 +1951,7 @@
             <a:fld id="{664439BC-D5DA-4702-A251-DDE5BDB443B9}" type="datetimeFigureOut">
               <a:rPr lang="en-GB" smtClean="0"/>
               <a:pPr/>
-              <a:t>04/02/2013</a:t>
+              <a:t>07/06/2016</a:t>
             </a:fld>
             <a:endParaRPr lang="en-GB"/>
           </a:p>
@@ -2005,7 +2003,7 @@
     </p:spTree>
     <p:extLst>
       <p:ext uri="{BB962C8B-B14F-4D97-AF65-F5344CB8AC3E}">
-        <p14:creationId xmlns:p14="http://schemas.microsoft.com/office/powerpoint/2010/main" xmlns="" val="3411555978"/>
+        <p14:creationId xmlns="" xmlns:p14="http://schemas.microsoft.com/office/powerpoint/2010/main" val="3411555978"/>
       </p:ext>
     </p:extLst>
   </p:cSld>
@@ -2073,7 +2071,7 @@
             <a:fld id="{664439BC-D5DA-4702-A251-DDE5BDB443B9}" type="datetimeFigureOut">
               <a:rPr lang="en-GB" smtClean="0"/>
               <a:pPr/>
-              <a:t>04/02/2013</a:t>
+              <a:t>07/06/2016</a:t>
             </a:fld>
             <a:endParaRPr lang="en-GB"/>
           </a:p>
@@ -2125,7 +2123,7 @@
     </p:spTree>
     <p:extLst>
       <p:ext uri="{BB962C8B-B14F-4D97-AF65-F5344CB8AC3E}">
-        <p14:creationId xmlns:p14="http://schemas.microsoft.com/office/powerpoint/2010/main" xmlns="" val="965855008"/>
+        <p14:creationId xmlns="" xmlns:p14="http://schemas.microsoft.com/office/powerpoint/2010/main" val="965855008"/>
       </p:ext>
     </p:extLst>
   </p:cSld>
@@ -2170,7 +2168,7 @@
             <a:fld id="{664439BC-D5DA-4702-A251-DDE5BDB443B9}" type="datetimeFigureOut">
               <a:rPr lang="en-GB" smtClean="0"/>
               <a:pPr/>
-              <a:t>04/02/2013</a:t>
+              <a:t>07/06/2016</a:t>
             </a:fld>
             <a:endParaRPr lang="en-GB"/>
           </a:p>
@@ -2222,7 +2220,7 @@
     </p:spTree>
     <p:extLst>
       <p:ext uri="{BB962C8B-B14F-4D97-AF65-F5344CB8AC3E}">
-        <p14:creationId xmlns:p14="http://schemas.microsoft.com/office/powerpoint/2010/main" xmlns="" val="3111584547"/>
+        <p14:creationId xmlns="" xmlns:p14="http://schemas.microsoft.com/office/powerpoint/2010/main" val="3111584547"/>
       </p:ext>
     </p:extLst>
   </p:cSld>
@@ -2449,7 +2447,7 @@
             <a:fld id="{664439BC-D5DA-4702-A251-DDE5BDB443B9}" type="datetimeFigureOut">
               <a:rPr lang="en-GB" smtClean="0"/>
               <a:pPr/>
-              <a:t>04/02/2013</a:t>
+              <a:t>07/06/2016</a:t>
             </a:fld>
             <a:endParaRPr lang="en-GB"/>
           </a:p>
@@ -2501,7 +2499,7 @@
     </p:spTree>
     <p:extLst>
       <p:ext uri="{BB962C8B-B14F-4D97-AF65-F5344CB8AC3E}">
-        <p14:creationId xmlns:p14="http://schemas.microsoft.com/office/powerpoint/2010/main" xmlns="" val="3268992834"/>
+        <p14:creationId xmlns="" xmlns:p14="http://schemas.microsoft.com/office/powerpoint/2010/main" val="3268992834"/>
       </p:ext>
     </p:extLst>
   </p:cSld>
@@ -2704,7 +2702,7 @@
             <a:fld id="{664439BC-D5DA-4702-A251-DDE5BDB443B9}" type="datetimeFigureOut">
               <a:rPr lang="en-GB" smtClean="0"/>
               <a:pPr/>
-              <a:t>04/02/2013</a:t>
+              <a:t>07/06/2016</a:t>
             </a:fld>
             <a:endParaRPr lang="en-GB"/>
           </a:p>
@@ -2756,7 +2754,7 @@
     </p:spTree>
     <p:extLst>
       <p:ext uri="{BB962C8B-B14F-4D97-AF65-F5344CB8AC3E}">
-        <p14:creationId xmlns:p14="http://schemas.microsoft.com/office/powerpoint/2010/main" xmlns="" val="791194475"/>
+        <p14:creationId xmlns="" xmlns:p14="http://schemas.microsoft.com/office/powerpoint/2010/main" val="791194475"/>
       </p:ext>
     </p:extLst>
   </p:cSld>
@@ -2919,7 +2917,7 @@
             <a:fld id="{664439BC-D5DA-4702-A251-DDE5BDB443B9}" type="datetimeFigureOut">
               <a:rPr lang="en-GB" smtClean="0"/>
               <a:pPr/>
-              <a:t>04/02/2013</a:t>
+              <a:t>07/06/2016</a:t>
             </a:fld>
             <a:endParaRPr lang="en-GB"/>
           </a:p>
@@ -3007,7 +3005,7 @@
     </p:spTree>
     <p:extLst>
       <p:ext uri="{BB962C8B-B14F-4D97-AF65-F5344CB8AC3E}">
-        <p14:creationId xmlns:p14="http://schemas.microsoft.com/office/powerpoint/2010/main" xmlns="" val="3121498271"/>
+        <p14:creationId xmlns="" xmlns:p14="http://schemas.microsoft.com/office/powerpoint/2010/main" val="3121498271"/>
       </p:ext>
     </p:extLst>
   </p:cSld>
@@ -3367,10 +3365,10 @@
           <p:nvPr/>
         </p:nvPicPr>
         <p:blipFill>
-          <a:blip r:embed="rId2">
+          <a:blip r:embed="rId2" cstate="print">
             <a:extLst>
               <a:ext uri="{28A0092B-C50C-407E-A947-70E740481C1C}">
-                <a14:useLocalDpi xmlns:a14="http://schemas.microsoft.com/office/drawing/2010/main" xmlns="" val="0"/>
+                <a14:useLocalDpi xmlns="" xmlns:a14="http://schemas.microsoft.com/office/drawing/2010/main" val="0"/>
               </a:ext>
             </a:extLst>
           </a:blip>
@@ -3394,14 +3392,14 @@
           <a:effectLst/>
           <a:extLst>
             <a:ext uri="{909E8E84-426E-40DD-AFC4-6F175D3DCCD1}">
-              <a14:hiddenFill xmlns:a14="http://schemas.microsoft.com/office/drawing/2010/main" xmlns="">
+              <a14:hiddenFill xmlns="" xmlns:a14="http://schemas.microsoft.com/office/drawing/2010/main">
                 <a:solidFill>
                   <a:schemeClr val="accent1"/>
                 </a:solidFill>
               </a14:hiddenFill>
             </a:ext>
             <a:ext uri="{91240B29-F687-4F45-9708-019B960494DF}">
-              <a14:hiddenLine xmlns:a14="http://schemas.microsoft.com/office/drawing/2010/main" xmlns="" w="9525">
+              <a14:hiddenLine xmlns="" xmlns:a14="http://schemas.microsoft.com/office/drawing/2010/main" w="9525">
                 <a:solidFill>
                   <a:schemeClr val="tx1"/>
                 </a:solidFill>
@@ -3411,7 +3409,7 @@
               </a14:hiddenLine>
             </a:ext>
             <a:ext uri="{AF507438-7753-43E0-B8FC-AC1667EBCBE1}">
-              <a14:hiddenEffects xmlns:a14="http://schemas.microsoft.com/office/drawing/2010/main" xmlns="">
+              <a14:hiddenEffects xmlns="" xmlns:a14="http://schemas.microsoft.com/office/drawing/2010/main">
                 <a:effectLst>
                   <a:outerShdw dist="35921" dir="2700000" algn="ctr" rotWithShape="0">
                     <a:schemeClr val="bg2"/>
@@ -3425,7 +3423,7 @@
     </p:spTree>
     <p:extLst>
       <p:ext uri="{BB962C8B-B14F-4D97-AF65-F5344CB8AC3E}">
-        <p14:creationId xmlns:p14="http://schemas.microsoft.com/office/powerpoint/2010/main" xmlns="" val="1551580951"/>
+        <p14:creationId xmlns="" xmlns:p14="http://schemas.microsoft.com/office/powerpoint/2010/main" val="1551580951"/>
       </p:ext>
     </p:extLst>
   </p:cSld>
@@ -3469,7 +3467,7 @@
           <a:p>
             <a:r>
               <a:rPr lang="en-GB" dirty="0" smtClean="0"/>
-              <a:t>Objects Interacting</a:t>
+              <a:t>Feedback</a:t>
             </a:r>
             <a:endParaRPr lang="en-GB" dirty="0"/>
           </a:p>
@@ -3492,11 +3490,19 @@
           <a:p>
             <a:r>
               <a:rPr lang="en-GB" dirty="0" smtClean="0"/>
-              <a:t>Show interaction, shooting, bumping into, eating </a:t>
-            </a:r>
-            <a:r>
-              <a:rPr lang="en-GB" dirty="0" err="1" smtClean="0"/>
-              <a:t>etc</a:t>
+              <a:t>Feedback given</a:t>
+            </a:r>
+          </a:p>
+          <a:p>
+            <a:endParaRPr lang="en-GB" dirty="0"/>
+          </a:p>
+          <a:p>
+            <a:endParaRPr lang="en-GB" dirty="0" smtClean="0"/>
+          </a:p>
+          <a:p>
+            <a:r>
+              <a:rPr lang="en-GB" dirty="0" smtClean="0"/>
+              <a:t>Improvements made</a:t>
             </a:r>
             <a:endParaRPr lang="en-GB" dirty="0"/>
           </a:p>
@@ -3505,327 +3511,7 @@
     </p:spTree>
     <p:extLst>
       <p:ext uri="{BB962C8B-B14F-4D97-AF65-F5344CB8AC3E}">
-        <p14:creationId xmlns:p14="http://schemas.microsoft.com/office/powerpoint/2010/main" xmlns="" val="391132651"/>
-      </p:ext>
-    </p:extLst>
-  </p:cSld>
-  <p:clrMapOvr>
-    <a:masterClrMapping/>
-  </p:clrMapOvr>
-</p:sld>
-</file>
-
-<file path=ppt/slides/slide11.xml><?xml version="1.0" encoding="utf-8"?>
-<p:sld xmlns:a="http://schemas.openxmlformats.org/drawingml/2006/main" xmlns:r="http://schemas.openxmlformats.org/officeDocument/2006/relationships" xmlns:p="http://schemas.openxmlformats.org/presentationml/2006/main">
-  <p:cSld>
-    <p:spTree>
-      <p:nvGrpSpPr>
-        <p:cNvPr id="1" name=""/>
-        <p:cNvGrpSpPr/>
-        <p:nvPr/>
-      </p:nvGrpSpPr>
-      <p:grpSpPr>
-        <a:xfrm>
-          <a:off x="0" y="0"/>
-          <a:ext cx="0" cy="0"/>
-          <a:chOff x="0" y="0"/>
-          <a:chExt cx="0" cy="0"/>
-        </a:xfrm>
-      </p:grpSpPr>
-      <p:sp>
-        <p:nvSpPr>
-          <p:cNvPr id="2" name="Title 1"/>
-          <p:cNvSpPr>
-            <a:spLocks noGrp="1"/>
-          </p:cNvSpPr>
-          <p:nvPr>
-            <p:ph type="title"/>
-          </p:nvPr>
-        </p:nvSpPr>
-        <p:spPr/>
-        <p:txBody>
-          <a:bodyPr/>
-          <a:lstStyle/>
-          <a:p>
-            <a:r>
-              <a:rPr lang="en-GB" dirty="0" smtClean="0"/>
-              <a:t>Pathways</a:t>
-            </a:r>
-            <a:endParaRPr lang="en-GB" dirty="0"/>
-          </a:p>
-        </p:txBody>
-      </p:sp>
-      <p:sp>
-        <p:nvSpPr>
-          <p:cNvPr id="3" name="Content Placeholder 2"/>
-          <p:cNvSpPr>
-            <a:spLocks noGrp="1"/>
-          </p:cNvSpPr>
-          <p:nvPr>
-            <p:ph idx="1"/>
-          </p:nvPr>
-        </p:nvSpPr>
-        <p:spPr/>
-        <p:txBody>
-          <a:bodyPr/>
-          <a:lstStyle/>
-          <a:p>
-            <a:r>
-              <a:rPr lang="en-GB" dirty="0" smtClean="0"/>
-              <a:t>Have you got an object on a pathway</a:t>
-            </a:r>
-            <a:endParaRPr lang="en-GB" dirty="0"/>
-          </a:p>
-        </p:txBody>
-      </p:sp>
-    </p:spTree>
-    <p:extLst>
-      <p:ext uri="{BB962C8B-B14F-4D97-AF65-F5344CB8AC3E}">
-        <p14:creationId xmlns:p14="http://schemas.microsoft.com/office/powerpoint/2010/main" xmlns="" val="673020306"/>
-      </p:ext>
-    </p:extLst>
-  </p:cSld>
-  <p:clrMapOvr>
-    <a:masterClrMapping/>
-  </p:clrMapOvr>
-</p:sld>
-</file>
-
-<file path=ppt/slides/slide12.xml><?xml version="1.0" encoding="utf-8"?>
-<p:sld xmlns:a="http://schemas.openxmlformats.org/drawingml/2006/main" xmlns:r="http://schemas.openxmlformats.org/officeDocument/2006/relationships" xmlns:p="http://schemas.openxmlformats.org/presentationml/2006/main">
-  <p:cSld>
-    <p:spTree>
-      <p:nvGrpSpPr>
-        <p:cNvPr id="1" name=""/>
-        <p:cNvGrpSpPr/>
-        <p:nvPr/>
-      </p:nvGrpSpPr>
-      <p:grpSpPr>
-        <a:xfrm>
-          <a:off x="0" y="0"/>
-          <a:ext cx="0" cy="0"/>
-          <a:chOff x="0" y="0"/>
-          <a:chExt cx="0" cy="0"/>
-        </a:xfrm>
-      </p:grpSpPr>
-      <p:sp>
-        <p:nvSpPr>
-          <p:cNvPr id="2" name="Title 1"/>
-          <p:cNvSpPr>
-            <a:spLocks noGrp="1"/>
-          </p:cNvSpPr>
-          <p:nvPr>
-            <p:ph type="title"/>
-          </p:nvPr>
-        </p:nvSpPr>
-        <p:spPr/>
-        <p:txBody>
-          <a:bodyPr/>
-          <a:lstStyle/>
-          <a:p>
-            <a:r>
-              <a:rPr lang="en-GB" dirty="0" err="1"/>
-              <a:t>C</a:t>
-            </a:r>
-            <a:r>
-              <a:rPr lang="en-GB" dirty="0" err="1" smtClean="0"/>
-              <a:t>reatables</a:t>
-            </a:r>
-            <a:endParaRPr lang="en-GB" dirty="0"/>
-          </a:p>
-        </p:txBody>
-      </p:sp>
-      <p:sp>
-        <p:nvSpPr>
-          <p:cNvPr id="3" name="Content Placeholder 2"/>
-          <p:cNvSpPr>
-            <a:spLocks noGrp="1"/>
-          </p:cNvSpPr>
-          <p:nvPr>
-            <p:ph idx="1"/>
-          </p:nvPr>
-        </p:nvSpPr>
-        <p:spPr/>
-        <p:txBody>
-          <a:bodyPr/>
-          <a:lstStyle/>
-          <a:p>
-            <a:r>
-              <a:rPr lang="en-GB" dirty="0" smtClean="0"/>
-              <a:t>Show your creatable working</a:t>
-            </a:r>
-            <a:endParaRPr lang="en-GB" dirty="0"/>
-          </a:p>
-        </p:txBody>
-      </p:sp>
-    </p:spTree>
-    <p:extLst>
-      <p:ext uri="{BB962C8B-B14F-4D97-AF65-F5344CB8AC3E}">
-        <p14:creationId xmlns:p14="http://schemas.microsoft.com/office/powerpoint/2010/main" xmlns="" val="1458729856"/>
-      </p:ext>
-    </p:extLst>
-  </p:cSld>
-  <p:clrMapOvr>
-    <a:masterClrMapping/>
-  </p:clrMapOvr>
-</p:sld>
-</file>
-
-<file path=ppt/slides/slide13.xml><?xml version="1.0" encoding="utf-8"?>
-<p:sld xmlns:a="http://schemas.openxmlformats.org/drawingml/2006/main" xmlns:r="http://schemas.openxmlformats.org/officeDocument/2006/relationships" xmlns:p="http://schemas.openxmlformats.org/presentationml/2006/main">
-  <p:cSld>
-    <p:spTree>
-      <p:nvGrpSpPr>
-        <p:cNvPr id="1" name=""/>
-        <p:cNvGrpSpPr/>
-        <p:nvPr/>
-      </p:nvGrpSpPr>
-      <p:grpSpPr>
-        <a:xfrm>
-          <a:off x="0" y="0"/>
-          <a:ext cx="0" cy="0"/>
-          <a:chOff x="0" y="0"/>
-          <a:chExt cx="0" cy="0"/>
-        </a:xfrm>
-      </p:grpSpPr>
-      <p:sp>
-        <p:nvSpPr>
-          <p:cNvPr id="2" name="Title 1"/>
-          <p:cNvSpPr>
-            <a:spLocks noGrp="1"/>
-          </p:cNvSpPr>
-          <p:nvPr>
-            <p:ph type="title"/>
-          </p:nvPr>
-        </p:nvSpPr>
-        <p:spPr/>
-        <p:txBody>
-          <a:bodyPr/>
-          <a:lstStyle/>
-          <a:p>
-            <a:r>
-              <a:rPr lang="en-GB" dirty="0" smtClean="0"/>
-              <a:t>Two players</a:t>
-            </a:r>
-            <a:endParaRPr lang="en-GB" dirty="0"/>
-          </a:p>
-        </p:txBody>
-      </p:sp>
-      <p:sp>
-        <p:nvSpPr>
-          <p:cNvPr id="3" name="Content Placeholder 2"/>
-          <p:cNvSpPr>
-            <a:spLocks noGrp="1"/>
-          </p:cNvSpPr>
-          <p:nvPr>
-            <p:ph idx="1"/>
-          </p:nvPr>
-        </p:nvSpPr>
-        <p:spPr/>
-        <p:txBody>
-          <a:bodyPr/>
-          <a:lstStyle/>
-          <a:p>
-            <a:r>
-              <a:rPr lang="en-GB" dirty="0" smtClean="0"/>
-              <a:t>What keys move them?</a:t>
-            </a:r>
-            <a:endParaRPr lang="en-GB" dirty="0"/>
-          </a:p>
-        </p:txBody>
-      </p:sp>
-    </p:spTree>
-    <p:extLst>
-      <p:ext uri="{BB962C8B-B14F-4D97-AF65-F5344CB8AC3E}">
-        <p14:creationId xmlns:p14="http://schemas.microsoft.com/office/powerpoint/2010/main" xmlns="" val="1312297188"/>
-      </p:ext>
-    </p:extLst>
-  </p:cSld>
-  <p:clrMapOvr>
-    <a:masterClrMapping/>
-  </p:clrMapOvr>
-</p:sld>
-</file>
-
-<file path=ppt/slides/slide14.xml><?xml version="1.0" encoding="utf-8"?>
-<p:sld xmlns:a="http://schemas.openxmlformats.org/drawingml/2006/main" xmlns:r="http://schemas.openxmlformats.org/officeDocument/2006/relationships" xmlns:p="http://schemas.openxmlformats.org/presentationml/2006/main">
-  <p:cSld>
-    <p:spTree>
-      <p:nvGrpSpPr>
-        <p:cNvPr id="1" name=""/>
-        <p:cNvGrpSpPr/>
-        <p:nvPr/>
-      </p:nvGrpSpPr>
-      <p:grpSpPr>
-        <a:xfrm>
-          <a:off x="0" y="0"/>
-          <a:ext cx="0" cy="0"/>
-          <a:chOff x="0" y="0"/>
-          <a:chExt cx="0" cy="0"/>
-        </a:xfrm>
-      </p:grpSpPr>
-      <p:sp>
-        <p:nvSpPr>
-          <p:cNvPr id="2" name="Title 1"/>
-          <p:cNvSpPr>
-            <a:spLocks noGrp="1"/>
-          </p:cNvSpPr>
-          <p:nvPr>
-            <p:ph type="title"/>
-          </p:nvPr>
-        </p:nvSpPr>
-        <p:spPr/>
-        <p:txBody>
-          <a:bodyPr/>
-          <a:lstStyle/>
-          <a:p>
-            <a:r>
-              <a:rPr lang="en-GB" dirty="0" smtClean="0"/>
-              <a:t>Feedback</a:t>
-            </a:r>
-            <a:endParaRPr lang="en-GB" dirty="0"/>
-          </a:p>
-        </p:txBody>
-      </p:sp>
-      <p:sp>
-        <p:nvSpPr>
-          <p:cNvPr id="3" name="Content Placeholder 2"/>
-          <p:cNvSpPr>
-            <a:spLocks noGrp="1"/>
-          </p:cNvSpPr>
-          <p:nvPr>
-            <p:ph idx="1"/>
-          </p:nvPr>
-        </p:nvSpPr>
-        <p:spPr/>
-        <p:txBody>
-          <a:bodyPr/>
-          <a:lstStyle/>
-          <a:p>
-            <a:r>
-              <a:rPr lang="en-GB" dirty="0" smtClean="0"/>
-              <a:t>Feedback given</a:t>
-            </a:r>
-          </a:p>
-          <a:p>
-            <a:endParaRPr lang="en-GB" dirty="0"/>
-          </a:p>
-          <a:p>
-            <a:endParaRPr lang="en-GB" dirty="0" smtClean="0"/>
-          </a:p>
-          <a:p>
-            <a:r>
-              <a:rPr lang="en-GB" dirty="0" smtClean="0"/>
-              <a:t>Improvements made</a:t>
-            </a:r>
-            <a:endParaRPr lang="en-GB" dirty="0"/>
-          </a:p>
-        </p:txBody>
-      </p:sp>
-    </p:spTree>
-    <p:extLst>
-      <p:ext uri="{BB962C8B-B14F-4D97-AF65-F5344CB8AC3E}">
-        <p14:creationId xmlns:p14="http://schemas.microsoft.com/office/powerpoint/2010/main" xmlns="" val="4283801564"/>
+        <p14:creationId xmlns="" xmlns:p14="http://schemas.microsoft.com/office/powerpoint/2010/main" val="4283801564"/>
       </p:ext>
     </p:extLst>
   </p:cSld>
@@ -3869,7 +3555,7 @@
           <a:p>
             <a:r>
               <a:rPr lang="en-GB" dirty="0" smtClean="0"/>
-              <a:t>Level 3</a:t>
+              <a:t>Aim and Audience</a:t>
             </a:r>
             <a:endParaRPr lang="en-GB" dirty="0"/>
           </a:p>
@@ -3887,28 +3573,36 @@
         </p:nvSpPr>
         <p:spPr/>
         <p:txBody>
-          <a:bodyPr>
-            <a:noAutofit/>
-          </a:bodyPr>
-          <a:lstStyle/>
-          <a:p>
-            <a:r>
-              <a:rPr lang="en-GB" sz="2800" dirty="0" smtClean="0"/>
-              <a:t>Students will plan a game. Students will comment on the success of the game</a:t>
-            </a:r>
-          </a:p>
-          <a:p>
-            <a:r>
-              <a:rPr lang="en-GB" sz="2800" dirty="0" smtClean="0"/>
-              <a:t>Students will create a world with objects in it. Students will alter the terrain of the world. The game will have a moving object, controlled by the keyboard. </a:t>
-            </a:r>
+          <a:bodyPr/>
+          <a:lstStyle/>
+          <a:p>
+            <a:r>
+              <a:rPr lang="en-GB" dirty="0" smtClean="0"/>
+              <a:t>What is the aim of the game?</a:t>
+            </a:r>
+          </a:p>
+          <a:p>
+            <a:endParaRPr lang="en-GB" dirty="0"/>
+          </a:p>
+          <a:p>
+            <a:endParaRPr lang="en-GB" dirty="0" smtClean="0"/>
+          </a:p>
+          <a:p>
+            <a:endParaRPr lang="en-GB" dirty="0"/>
+          </a:p>
+          <a:p>
+            <a:r>
+              <a:rPr lang="en-GB" dirty="0" smtClean="0"/>
+              <a:t>Who is the target audience?</a:t>
+            </a:r>
+            <a:endParaRPr lang="en-GB" dirty="0"/>
           </a:p>
         </p:txBody>
       </p:sp>
     </p:spTree>
     <p:extLst>
       <p:ext uri="{BB962C8B-B14F-4D97-AF65-F5344CB8AC3E}">
-        <p14:creationId xmlns:p14="http://schemas.microsoft.com/office/powerpoint/2010/main" xmlns="" val="1768797087"/>
+        <p14:creationId xmlns="" xmlns:p14="http://schemas.microsoft.com/office/powerpoint/2010/main" val="348865727"/>
       </p:ext>
     </p:extLst>
   </p:cSld>
@@ -3952,7 +3646,7 @@
           <a:p>
             <a:r>
               <a:rPr lang="en-GB" dirty="0" smtClean="0"/>
-              <a:t>Level 4</a:t>
+              <a:t>Test strategies</a:t>
             </a:r>
             <a:endParaRPr lang="en-GB" dirty="0"/>
           </a:p>
@@ -3970,23 +3664,13 @@
         </p:nvSpPr>
         <p:spPr/>
         <p:txBody>
-          <a:bodyPr>
-            <a:normAutofit fontScale="92500" lnSpcReduction="10000"/>
-          </a:bodyPr>
+          <a:bodyPr/>
           <a:lstStyle/>
           <a:p>
             <a:r>
               <a:rPr lang="en-GB" dirty="0" smtClean="0"/>
-              <a:t>Students will plan a game for a specific target audience. Students will show evidence of how they have refined their game to meet their client’s needs (evidence of feedback). They will evaluate the success of their solution</a:t>
-            </a:r>
-          </a:p>
-          <a:p>
-            <a:r>
-              <a:rPr lang="en-GB" dirty="0" smtClean="0"/>
-              <a:t>Students will create a world with objects in it. Students will alter the terrain of the world to suit the purpose of the game. The game will have a moving object that responds to other objects and demonstrates output </a:t>
-            </a:r>
-          </a:p>
-          <a:p>
+              <a:t>How will you test the game?</a:t>
+            </a:r>
             <a:endParaRPr lang="en-GB" dirty="0"/>
           </a:p>
         </p:txBody>
@@ -3994,7 +3678,7 @@
     </p:spTree>
     <p:extLst>
       <p:ext uri="{BB962C8B-B14F-4D97-AF65-F5344CB8AC3E}">
-        <p14:creationId xmlns:p14="http://schemas.microsoft.com/office/powerpoint/2010/main" xmlns="" val="1969216082"/>
+        <p14:creationId xmlns="" xmlns:p14="http://schemas.microsoft.com/office/powerpoint/2010/main" val="1262494913"/>
       </p:ext>
     </p:extLst>
   </p:cSld>
@@ -4038,7 +3722,7 @@
           <a:p>
             <a:r>
               <a:rPr lang="en-GB" dirty="0" smtClean="0"/>
-              <a:t>Level 5</a:t>
+              <a:t>Evidence of World created</a:t>
             </a:r>
             <a:endParaRPr lang="en-GB" dirty="0"/>
           </a:p>
@@ -4056,26 +3740,13 @@
         </p:nvSpPr>
         <p:spPr/>
         <p:txBody>
-          <a:bodyPr>
-            <a:normAutofit lnSpcReduction="10000"/>
-          </a:bodyPr>
-          <a:lstStyle/>
-          <a:p>
-            <a:r>
-              <a:rPr lang="en-GB" sz="2800" dirty="0" smtClean="0"/>
-              <a:t>Plan and develop a structured game which uses a combination of features to enhance the user’s experience.  Use criteria to evaluate the quality of solutions, identifying improvements and refining their work.</a:t>
-            </a:r>
-          </a:p>
-          <a:p>
-            <a:r>
-              <a:rPr lang="en-GB" sz="2800" dirty="0" smtClean="0"/>
-              <a:t>Students will create a more complex world with objects from an empty world. They would alter the terrain to include water, hills, walls and landscapes. The game would accommodate two players and would demonstrate interaction such as shooting and scoring</a:t>
-            </a:r>
-          </a:p>
-          <a:p>
-            <a:endParaRPr lang="en-GB" sz="1900" dirty="0" smtClean="0"/>
-          </a:p>
-          <a:p>
+          <a:bodyPr/>
+          <a:lstStyle/>
+          <a:p>
+            <a:r>
+              <a:rPr lang="en-GB" dirty="0" smtClean="0"/>
+              <a:t>Show the world you created and point out the changes in terrain</a:t>
+            </a:r>
             <a:endParaRPr lang="en-GB" dirty="0"/>
           </a:p>
         </p:txBody>
@@ -4083,7 +3754,7 @@
     </p:spTree>
     <p:extLst>
       <p:ext uri="{BB962C8B-B14F-4D97-AF65-F5344CB8AC3E}">
-        <p14:creationId xmlns:p14="http://schemas.microsoft.com/office/powerpoint/2010/main" xmlns="" val="1686648858"/>
+        <p14:creationId xmlns="" xmlns:p14="http://schemas.microsoft.com/office/powerpoint/2010/main" val="923092045"/>
       </p:ext>
     </p:extLst>
   </p:cSld>
@@ -4127,7 +3798,7 @@
           <a:p>
             <a:r>
               <a:rPr lang="en-GB" dirty="0" smtClean="0"/>
-              <a:t>Level 6 - 7</a:t>
+              <a:t>Objects Added</a:t>
             </a:r>
             <a:endParaRPr lang="en-GB" dirty="0"/>
           </a:p>
@@ -4145,45 +3816,13 @@
         </p:nvSpPr>
         <p:spPr/>
         <p:txBody>
-          <a:bodyPr>
-            <a:normAutofit fontScale="55000" lnSpcReduction="20000"/>
-          </a:bodyPr>
-          <a:lstStyle/>
-          <a:p>
-            <a:r>
-              <a:rPr lang="en-GB" sz="4800" dirty="0" smtClean="0"/>
-              <a:t>Plan and develop a structured game which uses a combination of features to enhance the user’s experience. </a:t>
-            </a:r>
-            <a:r>
-              <a:rPr lang="en-GB" sz="4800" b="1" dirty="0" smtClean="0"/>
-              <a:t> </a:t>
-            </a:r>
-            <a:r>
-              <a:rPr lang="en-GB" sz="4800" dirty="0" smtClean="0"/>
-              <a:t>Use criteria to evaluate the quality of solutions, identifying improvements and refining their work. The game will show logic and will include other levels of difficulty</a:t>
-            </a:r>
-          </a:p>
-          <a:p>
-            <a:r>
-              <a:rPr lang="en-GB" sz="4800" dirty="0" smtClean="0"/>
-              <a:t> </a:t>
-            </a:r>
-          </a:p>
-          <a:p>
-            <a:r>
-              <a:rPr lang="en-GB" sz="4800" dirty="0" smtClean="0"/>
-              <a:t>They would create a more complex tailor – made world suitable for the defined target audience. The game will involve more than one player with interaction such as scoring and losing points. The game might include more complex techniques such as pathways and </a:t>
-            </a:r>
-            <a:r>
-              <a:rPr lang="en-GB" sz="4800" dirty="0" err="1" smtClean="0"/>
-              <a:t>creatables</a:t>
-            </a:r>
-            <a:r>
-              <a:rPr lang="en-GB" sz="4800" dirty="0" smtClean="0"/>
-              <a:t>, camera movement and object behaviours</a:t>
-            </a:r>
-          </a:p>
-          <a:p>
+          <a:bodyPr/>
+          <a:lstStyle/>
+          <a:p>
+            <a:r>
+              <a:rPr lang="en-GB" dirty="0" smtClean="0"/>
+              <a:t>Show objects and what they do</a:t>
+            </a:r>
             <a:endParaRPr lang="en-GB" dirty="0"/>
           </a:p>
         </p:txBody>
@@ -4191,7 +3830,7 @@
     </p:spTree>
     <p:extLst>
       <p:ext uri="{BB962C8B-B14F-4D97-AF65-F5344CB8AC3E}">
-        <p14:creationId xmlns:p14="http://schemas.microsoft.com/office/powerpoint/2010/main" xmlns="" val="4046343702"/>
+        <p14:creationId xmlns="" xmlns:p14="http://schemas.microsoft.com/office/powerpoint/2010/main" val="3559094032"/>
       </p:ext>
     </p:extLst>
   </p:cSld>
@@ -4235,7 +3874,7 @@
           <a:p>
             <a:r>
               <a:rPr lang="en-GB" dirty="0" smtClean="0"/>
-              <a:t>Aim and Audience</a:t>
+              <a:t>Objects Interacting</a:t>
             </a:r>
             <a:endParaRPr lang="en-GB" dirty="0"/>
           </a:p>
@@ -4258,22 +3897,11 @@
           <a:p>
             <a:r>
               <a:rPr lang="en-GB" dirty="0" smtClean="0"/>
-              <a:t>What is the aim of the game?</a:t>
-            </a:r>
-          </a:p>
-          <a:p>
-            <a:endParaRPr lang="en-GB" dirty="0"/>
-          </a:p>
-          <a:p>
-            <a:endParaRPr lang="en-GB" dirty="0" smtClean="0"/>
-          </a:p>
-          <a:p>
-            <a:endParaRPr lang="en-GB" dirty="0"/>
-          </a:p>
-          <a:p>
-            <a:r>
-              <a:rPr lang="en-GB" dirty="0" smtClean="0"/>
-              <a:t>Who is the target audience?</a:t>
+              <a:t>Show interaction, shooting, bumping into, eating </a:t>
+            </a:r>
+            <a:r>
+              <a:rPr lang="en-GB" dirty="0" err="1" smtClean="0"/>
+              <a:t>etc</a:t>
             </a:r>
             <a:endParaRPr lang="en-GB" dirty="0"/>
           </a:p>
@@ -4282,7 +3910,7 @@
     </p:spTree>
     <p:extLst>
       <p:ext uri="{BB962C8B-B14F-4D97-AF65-F5344CB8AC3E}">
-        <p14:creationId xmlns:p14="http://schemas.microsoft.com/office/powerpoint/2010/main" xmlns="" val="348865727"/>
+        <p14:creationId xmlns="" xmlns:p14="http://schemas.microsoft.com/office/powerpoint/2010/main" val="391132651"/>
       </p:ext>
     </p:extLst>
   </p:cSld>
@@ -4326,7 +3954,7 @@
           <a:p>
             <a:r>
               <a:rPr lang="en-GB" dirty="0" smtClean="0"/>
-              <a:t>Test strategies</a:t>
+              <a:t>Pathways</a:t>
             </a:r>
             <a:endParaRPr lang="en-GB" dirty="0"/>
           </a:p>
@@ -4349,7 +3977,7 @@
           <a:p>
             <a:r>
               <a:rPr lang="en-GB" dirty="0" smtClean="0"/>
-              <a:t>How will you test the game?</a:t>
+              <a:t>Have you got an object on a pathway</a:t>
             </a:r>
             <a:endParaRPr lang="en-GB" dirty="0"/>
           </a:p>
@@ -4358,7 +3986,7 @@
     </p:spTree>
     <p:extLst>
       <p:ext uri="{BB962C8B-B14F-4D97-AF65-F5344CB8AC3E}">
-        <p14:creationId xmlns:p14="http://schemas.microsoft.com/office/powerpoint/2010/main" xmlns="" val="1262494913"/>
+        <p14:creationId xmlns="" xmlns:p14="http://schemas.microsoft.com/office/powerpoint/2010/main" val="673020306"/>
       </p:ext>
     </p:extLst>
   </p:cSld>
@@ -4401,31 +4029,35 @@
           <a:lstStyle/>
           <a:p>
             <a:r>
+              <a:rPr lang="en-GB" dirty="0" err="1"/>
+              <a:t>C</a:t>
+            </a:r>
+            <a:r>
+              <a:rPr lang="en-GB" dirty="0" err="1" smtClean="0"/>
+              <a:t>reatables</a:t>
+            </a:r>
+            <a:endParaRPr lang="en-GB" dirty="0"/>
+          </a:p>
+        </p:txBody>
+      </p:sp>
+      <p:sp>
+        <p:nvSpPr>
+          <p:cNvPr id="3" name="Content Placeholder 2"/>
+          <p:cNvSpPr>
+            <a:spLocks noGrp="1"/>
+          </p:cNvSpPr>
+          <p:nvPr>
+            <p:ph idx="1"/>
+          </p:nvPr>
+        </p:nvSpPr>
+        <p:spPr/>
+        <p:txBody>
+          <a:bodyPr/>
+          <a:lstStyle/>
+          <a:p>
+            <a:r>
               <a:rPr lang="en-GB" dirty="0" smtClean="0"/>
-              <a:t>Evidence of World created</a:t>
-            </a:r>
-            <a:endParaRPr lang="en-GB" dirty="0"/>
-          </a:p>
-        </p:txBody>
-      </p:sp>
-      <p:sp>
-        <p:nvSpPr>
-          <p:cNvPr id="3" name="Content Placeholder 2"/>
-          <p:cNvSpPr>
-            <a:spLocks noGrp="1"/>
-          </p:cNvSpPr>
-          <p:nvPr>
-            <p:ph idx="1"/>
-          </p:nvPr>
-        </p:nvSpPr>
-        <p:spPr/>
-        <p:txBody>
-          <a:bodyPr/>
-          <a:lstStyle/>
-          <a:p>
-            <a:r>
-              <a:rPr lang="en-GB" dirty="0" smtClean="0"/>
-              <a:t>Show the world you created and point out the changes in terrain</a:t>
+              <a:t>Show your creatable working</a:t>
             </a:r>
             <a:endParaRPr lang="en-GB" dirty="0"/>
           </a:p>
@@ -4434,7 +4066,7 @@
     </p:spTree>
     <p:extLst>
       <p:ext uri="{BB962C8B-B14F-4D97-AF65-F5344CB8AC3E}">
-        <p14:creationId xmlns:p14="http://schemas.microsoft.com/office/powerpoint/2010/main" xmlns="" val="923092045"/>
+        <p14:creationId xmlns="" xmlns:p14="http://schemas.microsoft.com/office/powerpoint/2010/main" val="1458729856"/>
       </p:ext>
     </p:extLst>
   </p:cSld>
@@ -4478,7 +4110,7 @@
           <a:p>
             <a:r>
               <a:rPr lang="en-GB" dirty="0" smtClean="0"/>
-              <a:t>Objects Added</a:t>
+              <a:t>Two players</a:t>
             </a:r>
             <a:endParaRPr lang="en-GB" dirty="0"/>
           </a:p>
@@ -4501,7 +4133,7 @@
           <a:p>
             <a:r>
               <a:rPr lang="en-GB" dirty="0" smtClean="0"/>
-              <a:t>Show objects and what they do</a:t>
+              <a:t>What keys move them?</a:t>
             </a:r>
             <a:endParaRPr lang="en-GB" dirty="0"/>
           </a:p>
@@ -4510,7 +4142,7 @@
     </p:spTree>
     <p:extLst>
       <p:ext uri="{BB962C8B-B14F-4D97-AF65-F5344CB8AC3E}">
-        <p14:creationId xmlns:p14="http://schemas.microsoft.com/office/powerpoint/2010/main" xmlns="" val="3559094032"/>
+        <p14:creationId xmlns="" xmlns:p14="http://schemas.microsoft.com/office/powerpoint/2010/main" val="1312297188"/>
       </p:ext>
     </p:extLst>
   </p:cSld>

</xml_diff>